<commit_message>
media PPT and PDF updated
</commit_message>
<xml_diff>
--- a/web/media/ppt/10SlidestimelineQRCode.pptx
+++ b/web/media/ppt/10SlidestimelineQRCode.pptx
@@ -272,7 +272,7 @@
           <a:p>
             <a:fld id="{3ABE52FA-3C23-44BD-B501-603726A78153}" type="datetimeFigureOut">
               <a:rPr lang="en-US" smtClean="0"/>
-              <a:t>20-03-18</a:t>
+              <a:t>29-03-18</a:t>
             </a:fld>
             <a:endParaRPr lang="en-US"/>
           </a:p>
@@ -470,7 +470,7 @@
           <a:p>
             <a:fld id="{3ABE52FA-3C23-44BD-B501-603726A78153}" type="datetimeFigureOut">
               <a:rPr lang="en-US" smtClean="0"/>
-              <a:t>20-03-18</a:t>
+              <a:t>29-03-18</a:t>
             </a:fld>
             <a:endParaRPr lang="en-US"/>
           </a:p>
@@ -678,7 +678,7 @@
           <a:p>
             <a:fld id="{3ABE52FA-3C23-44BD-B501-603726A78153}" type="datetimeFigureOut">
               <a:rPr lang="en-US" smtClean="0"/>
-              <a:t>20-03-18</a:t>
+              <a:t>29-03-18</a:t>
             </a:fld>
             <a:endParaRPr lang="en-US"/>
           </a:p>
@@ -876,7 +876,7 @@
           <a:p>
             <a:fld id="{3ABE52FA-3C23-44BD-B501-603726A78153}" type="datetimeFigureOut">
               <a:rPr lang="en-US" smtClean="0"/>
-              <a:t>20-03-18</a:t>
+              <a:t>29-03-18</a:t>
             </a:fld>
             <a:endParaRPr lang="en-US"/>
           </a:p>
@@ -1151,7 +1151,7 @@
           <a:p>
             <a:fld id="{3ABE52FA-3C23-44BD-B501-603726A78153}" type="datetimeFigureOut">
               <a:rPr lang="en-US" smtClean="0"/>
-              <a:t>20-03-18</a:t>
+              <a:t>29-03-18</a:t>
             </a:fld>
             <a:endParaRPr lang="en-US"/>
           </a:p>
@@ -1416,7 +1416,7 @@
           <a:p>
             <a:fld id="{3ABE52FA-3C23-44BD-B501-603726A78153}" type="datetimeFigureOut">
               <a:rPr lang="en-US" smtClean="0"/>
-              <a:t>20-03-18</a:t>
+              <a:t>29-03-18</a:t>
             </a:fld>
             <a:endParaRPr lang="en-US"/>
           </a:p>
@@ -1828,7 +1828,7 @@
           <a:p>
             <a:fld id="{3ABE52FA-3C23-44BD-B501-603726A78153}" type="datetimeFigureOut">
               <a:rPr lang="en-US" smtClean="0"/>
-              <a:t>20-03-18</a:t>
+              <a:t>29-03-18</a:t>
             </a:fld>
             <a:endParaRPr lang="en-US"/>
           </a:p>
@@ -1969,7 +1969,7 @@
           <a:p>
             <a:fld id="{3ABE52FA-3C23-44BD-B501-603726A78153}" type="datetimeFigureOut">
               <a:rPr lang="en-US" smtClean="0"/>
-              <a:t>20-03-18</a:t>
+              <a:t>29-03-18</a:t>
             </a:fld>
             <a:endParaRPr lang="en-US"/>
           </a:p>
@@ -2082,7 +2082,7 @@
           <a:p>
             <a:fld id="{3ABE52FA-3C23-44BD-B501-603726A78153}" type="datetimeFigureOut">
               <a:rPr lang="en-US" smtClean="0"/>
-              <a:t>20-03-18</a:t>
+              <a:t>29-03-18</a:t>
             </a:fld>
             <a:endParaRPr lang="en-US"/>
           </a:p>
@@ -2393,7 +2393,7 @@
           <a:p>
             <a:fld id="{3ABE52FA-3C23-44BD-B501-603726A78153}" type="datetimeFigureOut">
               <a:rPr lang="en-US" smtClean="0"/>
-              <a:t>20-03-18</a:t>
+              <a:t>29-03-18</a:t>
             </a:fld>
             <a:endParaRPr lang="en-US"/>
           </a:p>
@@ -2681,7 +2681,7 @@
           <a:p>
             <a:fld id="{3ABE52FA-3C23-44BD-B501-603726A78153}" type="datetimeFigureOut">
               <a:rPr lang="en-US" smtClean="0"/>
-              <a:t>20-03-18</a:t>
+              <a:t>29-03-18</a:t>
             </a:fld>
             <a:endParaRPr lang="en-US"/>
           </a:p>
@@ -2922,7 +2922,7 @@
           <a:p>
             <a:fld id="{3ABE52FA-3C23-44BD-B501-603726A78153}" type="datetimeFigureOut">
               <a:rPr lang="en-US" smtClean="0"/>
-              <a:t>20-03-18</a:t>
+              <a:t>29-03-18</a:t>
             </a:fld>
             <a:endParaRPr lang="en-US"/>
           </a:p>
@@ -3341,10 +3341,10 @@
       </p:grpSpPr>
       <p:pic>
         <p:nvPicPr>
-          <p:cNvPr id="2" name="Picture 1">
-            <a:extLst>
-              <a:ext uri="{FF2B5EF4-FFF2-40B4-BE49-F238E27FC236}">
-                <a16:creationId xmlns:a16="http://schemas.microsoft.com/office/drawing/2014/main" id="{A0B24292-044A-4C96-AEDD-09729CE0E720}"/>
+          <p:cNvPr id="3" name="Picture 2">
+            <a:extLst>
+              <a:ext uri="{FF2B5EF4-FFF2-40B4-BE49-F238E27FC236}">
+                <a16:creationId xmlns:a16="http://schemas.microsoft.com/office/drawing/2014/main" id="{D44BE6C3-6B86-41E9-B54A-30AEBD79DC5A}"/>
               </a:ext>
             </a:extLst>
           </p:cNvPr>
@@ -3361,8 +3361,8 @@
         </p:blipFill>
         <p:spPr>
           <a:xfrm>
-            <a:off x="3254928" y="881840"/>
-            <a:ext cx="5382993" cy="5106721"/>
+            <a:off x="2256639" y="34543"/>
+            <a:ext cx="6769216" cy="6823457"/>
           </a:xfrm>
           <a:prstGeom prst="rect">
             <a:avLst/>
@@ -3401,10 +3401,10 @@
       </p:grpSpPr>
       <p:pic>
         <p:nvPicPr>
-          <p:cNvPr id="6" name="Picture 5">
-            <a:extLst>
-              <a:ext uri="{FF2B5EF4-FFF2-40B4-BE49-F238E27FC236}">
-                <a16:creationId xmlns:a16="http://schemas.microsoft.com/office/drawing/2014/main" id="{B5A34B44-DFC3-4E59-9F30-88F3394A6D5D}"/>
+          <p:cNvPr id="2" name="Picture 1">
+            <a:extLst>
+              <a:ext uri="{FF2B5EF4-FFF2-40B4-BE49-F238E27FC236}">
+                <a16:creationId xmlns:a16="http://schemas.microsoft.com/office/drawing/2014/main" id="{6318178C-4388-446D-BA45-0AAA563B5F25}"/>
               </a:ext>
             </a:extLst>
           </p:cNvPr>
@@ -3414,21 +3414,15 @@
           <p:nvPr/>
         </p:nvPicPr>
         <p:blipFill>
-          <a:blip r:embed="rId2">
-            <a:extLst>
-              <a:ext uri="{28A0092B-C50C-407E-A947-70E740481C1C}">
-                <a14:useLocalDpi xmlns:a14="http://schemas.microsoft.com/office/drawing/2010/main" val="0"/>
-              </a:ext>
-            </a:extLst>
-          </a:blip>
+          <a:blip r:embed="rId2"/>
           <a:stretch>
             <a:fillRect/>
           </a:stretch>
         </p:blipFill>
         <p:spPr>
           <a:xfrm>
-            <a:off x="2457975" y="90224"/>
-            <a:ext cx="6622168" cy="6622168"/>
+            <a:off x="2444620" y="16503"/>
+            <a:ext cx="6807460" cy="6841497"/>
           </a:xfrm>
           <a:prstGeom prst="rect">
             <a:avLst/>
@@ -3487,8 +3481,8 @@
         </p:blipFill>
         <p:spPr>
           <a:xfrm>
-            <a:off x="2877424" y="754596"/>
-            <a:ext cx="5603977" cy="4886302"/>
+            <a:off x="1304032" y="0"/>
+            <a:ext cx="7865268" cy="6858000"/>
           </a:xfrm>
           <a:prstGeom prst="rect">
             <a:avLst/>
@@ -3547,8 +3541,8 @@
         </p:blipFill>
         <p:spPr>
           <a:xfrm>
-            <a:off x="2801924" y="773102"/>
-            <a:ext cx="6172330" cy="5437068"/>
+            <a:off x="1526796" y="16893"/>
+            <a:ext cx="7766239" cy="6841107"/>
           </a:xfrm>
           <a:prstGeom prst="rect">
             <a:avLst/>
@@ -3607,8 +3601,8 @@
         </p:blipFill>
         <p:spPr>
           <a:xfrm>
-            <a:off x="2533475" y="584939"/>
-            <a:ext cx="6122435" cy="5660743"/>
+            <a:off x="1551963" y="18289"/>
+            <a:ext cx="7397561" cy="6839712"/>
           </a:xfrm>
           <a:prstGeom prst="rect">
             <a:avLst/>
@@ -3667,8 +3661,8 @@
         </p:blipFill>
         <p:spPr>
           <a:xfrm>
-            <a:off x="2332140" y="420409"/>
-            <a:ext cx="6259627" cy="5624034"/>
+            <a:off x="1367406" y="-9670"/>
+            <a:ext cx="7643811" cy="6867670"/>
           </a:xfrm>
           <a:prstGeom prst="rect">
             <a:avLst/>
@@ -3727,8 +3721,8 @@
         </p:blipFill>
         <p:spPr>
           <a:xfrm>
-            <a:off x="2500988" y="721453"/>
-            <a:ext cx="6792529" cy="5580996"/>
+            <a:off x="1206829" y="0"/>
+            <a:ext cx="8346747" cy="6858000"/>
           </a:xfrm>
           <a:prstGeom prst="rect">
             <a:avLst/>
@@ -3787,8 +3781,8 @@
         </p:blipFill>
         <p:spPr>
           <a:xfrm>
-            <a:off x="2525085" y="974043"/>
-            <a:ext cx="6237215" cy="5032299"/>
+            <a:off x="1193423" y="0"/>
+            <a:ext cx="8500055" cy="6858000"/>
           </a:xfrm>
           <a:prstGeom prst="rect">
             <a:avLst/>
@@ -3847,8 +3841,8 @@
         </p:blipFill>
         <p:spPr>
           <a:xfrm>
-            <a:off x="2617364" y="535880"/>
-            <a:ext cx="6387999" cy="5622863"/>
+            <a:off x="1443737" y="0"/>
+            <a:ext cx="7905575" cy="6857999"/>
           </a:xfrm>
           <a:prstGeom prst="rect">
             <a:avLst/>
@@ -3887,10 +3881,10 @@
       </p:grpSpPr>
       <p:pic>
         <p:nvPicPr>
-          <p:cNvPr id="4" name="Picture 3">
-            <a:extLst>
-              <a:ext uri="{FF2B5EF4-FFF2-40B4-BE49-F238E27FC236}">
-                <a16:creationId xmlns:a16="http://schemas.microsoft.com/office/drawing/2014/main" id="{633E66D4-755D-4ED8-81AF-E1E5A25371DE}"/>
+          <p:cNvPr id="2" name="Picture 1">
+            <a:extLst>
+              <a:ext uri="{FF2B5EF4-FFF2-40B4-BE49-F238E27FC236}">
+                <a16:creationId xmlns:a16="http://schemas.microsoft.com/office/drawing/2014/main" id="{49647464-86AC-438E-9018-7EB9688F45A9}"/>
               </a:ext>
             </a:extLst>
           </p:cNvPr>
@@ -3900,21 +3894,15 @@
           <p:nvPr/>
         </p:nvPicPr>
         <p:blipFill>
-          <a:blip r:embed="rId2">
-            <a:extLst>
-              <a:ext uri="{28A0092B-C50C-407E-A947-70E740481C1C}">
-                <a14:useLocalDpi xmlns:a14="http://schemas.microsoft.com/office/drawing/2010/main" val="0"/>
-              </a:ext>
-            </a:extLst>
-          </a:blip>
+          <a:blip r:embed="rId2"/>
           <a:stretch>
             <a:fillRect/>
           </a:stretch>
         </p:blipFill>
         <p:spPr>
           <a:xfrm>
-            <a:off x="2290194" y="-30902"/>
-            <a:ext cx="6991370" cy="6991370"/>
+            <a:off x="2369976" y="4017"/>
+            <a:ext cx="6918745" cy="6853983"/>
           </a:xfrm>
           <a:prstGeom prst="rect">
             <a:avLst/>

</xml_diff>

<commit_message>
add more functions to test 1027 - edit page - thumbnail tab
</commit_message>
<xml_diff>
--- a/web/media/ppt/10SlidestimelineQRCode.pptx
+++ b/web/media/ppt/10SlidestimelineQRCode.pptx
@@ -272,7 +272,7 @@
           <a:p>
             <a:fld id="{3ABE52FA-3C23-44BD-B501-603726A78153}" type="datetimeFigureOut">
               <a:rPr lang="en-US" smtClean="0"/>
-              <a:t>20-03-18</a:t>
+              <a:t>29-03-18</a:t>
             </a:fld>
             <a:endParaRPr lang="en-US"/>
           </a:p>
@@ -470,7 +470,7 @@
           <a:p>
             <a:fld id="{3ABE52FA-3C23-44BD-B501-603726A78153}" type="datetimeFigureOut">
               <a:rPr lang="en-US" smtClean="0"/>
-              <a:t>20-03-18</a:t>
+              <a:t>29-03-18</a:t>
             </a:fld>
             <a:endParaRPr lang="en-US"/>
           </a:p>
@@ -678,7 +678,7 @@
           <a:p>
             <a:fld id="{3ABE52FA-3C23-44BD-B501-603726A78153}" type="datetimeFigureOut">
               <a:rPr lang="en-US" smtClean="0"/>
-              <a:t>20-03-18</a:t>
+              <a:t>29-03-18</a:t>
             </a:fld>
             <a:endParaRPr lang="en-US"/>
           </a:p>
@@ -876,7 +876,7 @@
           <a:p>
             <a:fld id="{3ABE52FA-3C23-44BD-B501-603726A78153}" type="datetimeFigureOut">
               <a:rPr lang="en-US" smtClean="0"/>
-              <a:t>20-03-18</a:t>
+              <a:t>29-03-18</a:t>
             </a:fld>
             <a:endParaRPr lang="en-US"/>
           </a:p>
@@ -1151,7 +1151,7 @@
           <a:p>
             <a:fld id="{3ABE52FA-3C23-44BD-B501-603726A78153}" type="datetimeFigureOut">
               <a:rPr lang="en-US" smtClean="0"/>
-              <a:t>20-03-18</a:t>
+              <a:t>29-03-18</a:t>
             </a:fld>
             <a:endParaRPr lang="en-US"/>
           </a:p>
@@ -1416,7 +1416,7 @@
           <a:p>
             <a:fld id="{3ABE52FA-3C23-44BD-B501-603726A78153}" type="datetimeFigureOut">
               <a:rPr lang="en-US" smtClean="0"/>
-              <a:t>20-03-18</a:t>
+              <a:t>29-03-18</a:t>
             </a:fld>
             <a:endParaRPr lang="en-US"/>
           </a:p>
@@ -1828,7 +1828,7 @@
           <a:p>
             <a:fld id="{3ABE52FA-3C23-44BD-B501-603726A78153}" type="datetimeFigureOut">
               <a:rPr lang="en-US" smtClean="0"/>
-              <a:t>20-03-18</a:t>
+              <a:t>29-03-18</a:t>
             </a:fld>
             <a:endParaRPr lang="en-US"/>
           </a:p>
@@ -1969,7 +1969,7 @@
           <a:p>
             <a:fld id="{3ABE52FA-3C23-44BD-B501-603726A78153}" type="datetimeFigureOut">
               <a:rPr lang="en-US" smtClean="0"/>
-              <a:t>20-03-18</a:t>
+              <a:t>29-03-18</a:t>
             </a:fld>
             <a:endParaRPr lang="en-US"/>
           </a:p>
@@ -2082,7 +2082,7 @@
           <a:p>
             <a:fld id="{3ABE52FA-3C23-44BD-B501-603726A78153}" type="datetimeFigureOut">
               <a:rPr lang="en-US" smtClean="0"/>
-              <a:t>20-03-18</a:t>
+              <a:t>29-03-18</a:t>
             </a:fld>
             <a:endParaRPr lang="en-US"/>
           </a:p>
@@ -2393,7 +2393,7 @@
           <a:p>
             <a:fld id="{3ABE52FA-3C23-44BD-B501-603726A78153}" type="datetimeFigureOut">
               <a:rPr lang="en-US" smtClean="0"/>
-              <a:t>20-03-18</a:t>
+              <a:t>29-03-18</a:t>
             </a:fld>
             <a:endParaRPr lang="en-US"/>
           </a:p>
@@ -2681,7 +2681,7 @@
           <a:p>
             <a:fld id="{3ABE52FA-3C23-44BD-B501-603726A78153}" type="datetimeFigureOut">
               <a:rPr lang="en-US" smtClean="0"/>
-              <a:t>20-03-18</a:t>
+              <a:t>29-03-18</a:t>
             </a:fld>
             <a:endParaRPr lang="en-US"/>
           </a:p>
@@ -2922,7 +2922,7 @@
           <a:p>
             <a:fld id="{3ABE52FA-3C23-44BD-B501-603726A78153}" type="datetimeFigureOut">
               <a:rPr lang="en-US" smtClean="0"/>
-              <a:t>20-03-18</a:t>
+              <a:t>29-03-18</a:t>
             </a:fld>
             <a:endParaRPr lang="en-US"/>
           </a:p>
@@ -3341,10 +3341,10 @@
       </p:grpSpPr>
       <p:pic>
         <p:nvPicPr>
-          <p:cNvPr id="2" name="Picture 1">
-            <a:extLst>
-              <a:ext uri="{FF2B5EF4-FFF2-40B4-BE49-F238E27FC236}">
-                <a16:creationId xmlns:a16="http://schemas.microsoft.com/office/drawing/2014/main" id="{A0B24292-044A-4C96-AEDD-09729CE0E720}"/>
+          <p:cNvPr id="3" name="Picture 2">
+            <a:extLst>
+              <a:ext uri="{FF2B5EF4-FFF2-40B4-BE49-F238E27FC236}">
+                <a16:creationId xmlns:a16="http://schemas.microsoft.com/office/drawing/2014/main" id="{D44BE6C3-6B86-41E9-B54A-30AEBD79DC5A}"/>
               </a:ext>
             </a:extLst>
           </p:cNvPr>
@@ -3361,8 +3361,8 @@
         </p:blipFill>
         <p:spPr>
           <a:xfrm>
-            <a:off x="3254928" y="881840"/>
-            <a:ext cx="5382993" cy="5106721"/>
+            <a:off x="2256639" y="34543"/>
+            <a:ext cx="6769216" cy="6823457"/>
           </a:xfrm>
           <a:prstGeom prst="rect">
             <a:avLst/>
@@ -3401,10 +3401,10 @@
       </p:grpSpPr>
       <p:pic>
         <p:nvPicPr>
-          <p:cNvPr id="6" name="Picture 5">
-            <a:extLst>
-              <a:ext uri="{FF2B5EF4-FFF2-40B4-BE49-F238E27FC236}">
-                <a16:creationId xmlns:a16="http://schemas.microsoft.com/office/drawing/2014/main" id="{B5A34B44-DFC3-4E59-9F30-88F3394A6D5D}"/>
+          <p:cNvPr id="2" name="Picture 1">
+            <a:extLst>
+              <a:ext uri="{FF2B5EF4-FFF2-40B4-BE49-F238E27FC236}">
+                <a16:creationId xmlns:a16="http://schemas.microsoft.com/office/drawing/2014/main" id="{6318178C-4388-446D-BA45-0AAA563B5F25}"/>
               </a:ext>
             </a:extLst>
           </p:cNvPr>
@@ -3414,21 +3414,15 @@
           <p:nvPr/>
         </p:nvPicPr>
         <p:blipFill>
-          <a:blip r:embed="rId2">
-            <a:extLst>
-              <a:ext uri="{28A0092B-C50C-407E-A947-70E740481C1C}">
-                <a14:useLocalDpi xmlns:a14="http://schemas.microsoft.com/office/drawing/2010/main" val="0"/>
-              </a:ext>
-            </a:extLst>
-          </a:blip>
+          <a:blip r:embed="rId2"/>
           <a:stretch>
             <a:fillRect/>
           </a:stretch>
         </p:blipFill>
         <p:spPr>
           <a:xfrm>
-            <a:off x="2457975" y="90224"/>
-            <a:ext cx="6622168" cy="6622168"/>
+            <a:off x="2444620" y="16503"/>
+            <a:ext cx="6807460" cy="6841497"/>
           </a:xfrm>
           <a:prstGeom prst="rect">
             <a:avLst/>
@@ -3487,8 +3481,8 @@
         </p:blipFill>
         <p:spPr>
           <a:xfrm>
-            <a:off x="2877424" y="754596"/>
-            <a:ext cx="5603977" cy="4886302"/>
+            <a:off x="1304032" y="0"/>
+            <a:ext cx="7865268" cy="6858000"/>
           </a:xfrm>
           <a:prstGeom prst="rect">
             <a:avLst/>
@@ -3547,8 +3541,8 @@
         </p:blipFill>
         <p:spPr>
           <a:xfrm>
-            <a:off x="2801924" y="773102"/>
-            <a:ext cx="6172330" cy="5437068"/>
+            <a:off x="1526796" y="16893"/>
+            <a:ext cx="7766239" cy="6841107"/>
           </a:xfrm>
           <a:prstGeom prst="rect">
             <a:avLst/>
@@ -3607,8 +3601,8 @@
         </p:blipFill>
         <p:spPr>
           <a:xfrm>
-            <a:off x="2533475" y="584939"/>
-            <a:ext cx="6122435" cy="5660743"/>
+            <a:off x="1551963" y="18289"/>
+            <a:ext cx="7397561" cy="6839712"/>
           </a:xfrm>
           <a:prstGeom prst="rect">
             <a:avLst/>
@@ -3667,8 +3661,8 @@
         </p:blipFill>
         <p:spPr>
           <a:xfrm>
-            <a:off x="2332140" y="420409"/>
-            <a:ext cx="6259627" cy="5624034"/>
+            <a:off x="1367406" y="-9670"/>
+            <a:ext cx="7643811" cy="6867670"/>
           </a:xfrm>
           <a:prstGeom prst="rect">
             <a:avLst/>
@@ -3727,8 +3721,8 @@
         </p:blipFill>
         <p:spPr>
           <a:xfrm>
-            <a:off x="2500988" y="721453"/>
-            <a:ext cx="6792529" cy="5580996"/>
+            <a:off x="1206829" y="0"/>
+            <a:ext cx="8346747" cy="6858000"/>
           </a:xfrm>
           <a:prstGeom prst="rect">
             <a:avLst/>
@@ -3787,8 +3781,8 @@
         </p:blipFill>
         <p:spPr>
           <a:xfrm>
-            <a:off x="2525085" y="974043"/>
-            <a:ext cx="6237215" cy="5032299"/>
+            <a:off x="1193423" y="0"/>
+            <a:ext cx="8500055" cy="6858000"/>
           </a:xfrm>
           <a:prstGeom prst="rect">
             <a:avLst/>
@@ -3847,8 +3841,8 @@
         </p:blipFill>
         <p:spPr>
           <a:xfrm>
-            <a:off x="2617364" y="535880"/>
-            <a:ext cx="6387999" cy="5622863"/>
+            <a:off x="1443737" y="0"/>
+            <a:ext cx="7905575" cy="6857999"/>
           </a:xfrm>
           <a:prstGeom prst="rect">
             <a:avLst/>
@@ -3887,10 +3881,10 @@
       </p:grpSpPr>
       <p:pic>
         <p:nvPicPr>
-          <p:cNvPr id="4" name="Picture 3">
-            <a:extLst>
-              <a:ext uri="{FF2B5EF4-FFF2-40B4-BE49-F238E27FC236}">
-                <a16:creationId xmlns:a16="http://schemas.microsoft.com/office/drawing/2014/main" id="{633E66D4-755D-4ED8-81AF-E1E5A25371DE}"/>
+          <p:cNvPr id="2" name="Picture 1">
+            <a:extLst>
+              <a:ext uri="{FF2B5EF4-FFF2-40B4-BE49-F238E27FC236}">
+                <a16:creationId xmlns:a16="http://schemas.microsoft.com/office/drawing/2014/main" id="{49647464-86AC-438E-9018-7EB9688F45A9}"/>
               </a:ext>
             </a:extLst>
           </p:cNvPr>
@@ -3900,21 +3894,15 @@
           <p:nvPr/>
         </p:nvPicPr>
         <p:blipFill>
-          <a:blip r:embed="rId2">
-            <a:extLst>
-              <a:ext uri="{28A0092B-C50C-407E-A947-70E740481C1C}">
-                <a14:useLocalDpi xmlns:a14="http://schemas.microsoft.com/office/drawing/2010/main" val="0"/>
-              </a:ext>
-            </a:extLst>
-          </a:blip>
+          <a:blip r:embed="rId2"/>
           <a:stretch>
             <a:fillRect/>
           </a:stretch>
         </p:blipFill>
         <p:spPr>
           <a:xfrm>
-            <a:off x="2290194" y="-30902"/>
-            <a:ext cx="6991370" cy="6991370"/>
+            <a:off x="2369976" y="4017"/>
+            <a:ext cx="6918745" cy="6853983"/>
           </a:xfrm>
           <a:prstGeom prst="rect">
             <a:avLst/>

</xml_diff>